<commit_message>
Adjustments, improvements and slides
</commit_message>
<xml_diff>
--- a/2020/dataset-serialize-restrequest/DataSet Serialize e RestRequest4Delphi, uma combinação que deu certo!.pptx
+++ b/2020/dataset-serialize-restrequest/DataSet Serialize e RestRequest4Delphi, uma combinação que deu certo!.pptx
@@ -1314,7 +1314,7 @@
               <a:buNone/>
             </a:pPr>
             <a:r>
-              <a:rPr lang="pt-BR" dirty="0"/>
+              <a:rPr lang="pt-BR" sz="2000" dirty="0"/>
               <a:t>A estrutura se concentra em JSON como o formato de representação. </a:t>
             </a:r>
           </a:p>
@@ -1329,7 +1329,7 @@
               <a:buNone/>
             </a:pPr>
             <a:r>
-              <a:rPr lang="pt-BR" dirty="0"/>
+              <a:rPr lang="pt-BR" sz="2000" dirty="0"/>
               <a:t>O formato XML não é compatível.</a:t>
             </a:r>
           </a:p>
@@ -1598,6 +1598,9 @@
           <a:bodyPr/>
           <a:lstStyle/>
           <a:p>
+            <a:endParaRPr lang="pt-BR" sz="2000" dirty="0"/>
+          </a:p>
+          <a:p>
             <a:r>
               <a:rPr lang="pt-BR" sz="2000" dirty="0"/>
               <a:t>É possível fazer o processo inverso também. Utilizar os dados de um </a:t>
@@ -4280,6 +4283,29 @@
             </a:r>
             <a:r>
               <a:rPr lang="pt-BR" sz="2000" i="1" u="sng" dirty="0"/>
+              <a:t>.</a:t>
+            </a:r>
+          </a:p>
+          <a:p>
+            <a:pPr marL="0" indent="0">
+              <a:buNone/>
+            </a:pPr>
+            <a:endParaRPr lang="pt-BR" sz="2000" i="1" u="sng" dirty="0"/>
+          </a:p>
+          <a:p>
+            <a:pPr marL="0" indent="0">
+              <a:buNone/>
+            </a:pPr>
+            <a:r>
+              <a:rPr lang="pt-BR" sz="2000" dirty="0"/>
+              <a:t>Compatibilidade com o </a:t>
+            </a:r>
+            <a:r>
+              <a:rPr lang="pt-BR" sz="2000" b="1" dirty="0" err="1"/>
+              <a:t>Larazus</a:t>
+            </a:r>
+            <a:r>
+              <a:rPr lang="pt-BR" sz="2000" dirty="0"/>
               <a:t>.</a:t>
             </a:r>
           </a:p>
@@ -4826,6 +4852,12 @@
 </file>
 
 <file path=customXml/item1.xml><?xml version="1.0" encoding="utf-8"?>
+<p:properties xmlns:p="http://schemas.microsoft.com/office/2006/metadata/properties" xmlns:xsi="http://www.w3.org/2001/XMLSchema-instance" xmlns:pc="http://schemas.microsoft.com/office/infopath/2007/PartnerControls">
+  <documentManagement/>
+</p:properties>
+</file>
+
+<file path=customXml/item2.xml><?xml version="1.0" encoding="utf-8"?>
 <ct:contentTypeSchema xmlns:ct="http://schemas.microsoft.com/office/2006/metadata/contentType" xmlns:ma="http://schemas.microsoft.com/office/2006/metadata/properties/metaAttributes" ct:_="" ma:_="" ma:contentTypeName="Documento" ma:contentTypeID="0x010100CD9438EC9C5993469CF61A1F46C57B83" ma:contentTypeVersion="10" ma:contentTypeDescription="Crie um novo documento." ma:contentTypeScope="" ma:versionID="62080b6bd8e6f4b26a868cd797796634">
   <xsd:schema xmlns:xsd="http://www.w3.org/2001/XMLSchema" xmlns:xs="http://www.w3.org/2001/XMLSchema" xmlns:p="http://schemas.microsoft.com/office/2006/metadata/properties" xmlns:ns3="35a886c1-c068-49eb-8a69-44d892a80394" targetNamespace="http://schemas.microsoft.com/office/2006/metadata/properties" ma:root="true" ma:fieldsID="a47701105542557c98ccc6d374aa4798" ns3:_="">
     <xsd:import namespace="35a886c1-c068-49eb-8a69-44d892a80394"/>
@@ -5009,12 +5041,6 @@
 </ct:contentTypeSchema>
 </file>
 
-<file path=customXml/item2.xml><?xml version="1.0" encoding="utf-8"?>
-<p:properties xmlns:p="http://schemas.microsoft.com/office/2006/metadata/properties" xmlns:xsi="http://www.w3.org/2001/XMLSchema-instance" xmlns:pc="http://schemas.microsoft.com/office/infopath/2007/PartnerControls">
-  <documentManagement/>
-</p:properties>
-</file>
-
 <file path=customXml/item3.xml><?xml version="1.0" encoding="utf-8"?>
 <?mso-contentType ?>
 <FormTemplates xmlns="http://schemas.microsoft.com/sharepoint/v3/contenttype/forms">
@@ -5025,6 +5051,22 @@
 </file>
 
 <file path=customXml/itemProps1.xml><?xml version="1.0" encoding="utf-8"?>
+<ds:datastoreItem xmlns:ds="http://schemas.openxmlformats.org/officeDocument/2006/customXml" ds:itemID="{FC13E19B-D56E-4327-A7E7-9A2C893B5877}">
+  <ds:schemaRefs>
+    <ds:schemaRef ds:uri="http://www.w3.org/XML/1998/namespace"/>
+    <ds:schemaRef ds:uri="http://purl.org/dc/dcmitype/"/>
+    <ds:schemaRef ds:uri="35a886c1-c068-49eb-8a69-44d892a80394"/>
+    <ds:schemaRef ds:uri="http://schemas.microsoft.com/office/infopath/2007/PartnerControls"/>
+    <ds:schemaRef ds:uri="http://schemas.microsoft.com/office/2006/documentManagement/types"/>
+    <ds:schemaRef ds:uri="http://purl.org/dc/terms/"/>
+    <ds:schemaRef ds:uri="http://purl.org/dc/elements/1.1/"/>
+    <ds:schemaRef ds:uri="http://schemas.openxmlformats.org/package/2006/metadata/core-properties"/>
+    <ds:schemaRef ds:uri="http://schemas.microsoft.com/office/2006/metadata/properties"/>
+  </ds:schemaRefs>
+</ds:datastoreItem>
+</file>
+
+<file path=customXml/itemProps2.xml><?xml version="1.0" encoding="utf-8"?>
 <ds:datastoreItem xmlns:ds="http://schemas.openxmlformats.org/officeDocument/2006/customXml" ds:itemID="{2DCA0572-8200-4C6D-ADE1-517BB2689EB3}">
   <ds:schemaRefs>
     <ds:schemaRef ds:uri="http://schemas.microsoft.com/office/2006/metadata/contentType"/>
@@ -5042,22 +5084,6 @@
 </ds:datastoreItem>
 </file>
 
-<file path=customXml/itemProps2.xml><?xml version="1.0" encoding="utf-8"?>
-<ds:datastoreItem xmlns:ds="http://schemas.openxmlformats.org/officeDocument/2006/customXml" ds:itemID="{FC13E19B-D56E-4327-A7E7-9A2C893B5877}">
-  <ds:schemaRefs>
-    <ds:schemaRef ds:uri="http://www.w3.org/XML/1998/namespace"/>
-    <ds:schemaRef ds:uri="http://purl.org/dc/dcmitype/"/>
-    <ds:schemaRef ds:uri="35a886c1-c068-49eb-8a69-44d892a80394"/>
-    <ds:schemaRef ds:uri="http://schemas.microsoft.com/office/infopath/2007/PartnerControls"/>
-    <ds:schemaRef ds:uri="http://schemas.microsoft.com/office/2006/documentManagement/types"/>
-    <ds:schemaRef ds:uri="http://purl.org/dc/terms/"/>
-    <ds:schemaRef ds:uri="http://purl.org/dc/elements/1.1/"/>
-    <ds:schemaRef ds:uri="http://schemas.openxmlformats.org/package/2006/metadata/core-properties"/>
-    <ds:schemaRef ds:uri="http://schemas.microsoft.com/office/2006/metadata/properties"/>
-  </ds:schemaRefs>
-</ds:datastoreItem>
-</file>
-
 <file path=customXml/itemProps3.xml><?xml version="1.0" encoding="utf-8"?>
 <ds:datastoreItem xmlns:ds="http://schemas.openxmlformats.org/officeDocument/2006/customXml" ds:itemID="{74453037-89E6-495B-97DC-7EFBB7414780}">
   <ds:schemaRefs>

</xml_diff>